<commit_message>
first lesson material upload
</commit_message>
<xml_diff>
--- a/network_introduction_2022/material/terminal_instructions.pptx
+++ b/network_introduction_2022/material/terminal_instructions.pptx
@@ -261,7 +261,7 @@
           <a:p>
             <a:fld id="{D8B7E551-822F-4896-9EDE-9E8F0CB865CE}" type="datetimeFigureOut">
               <a:rPr lang="it-IT" smtClean="0"/>
-              <a:t>03/12/2022</a:t>
+              <a:t>05/12/2022</a:t>
             </a:fld>
             <a:endParaRPr lang="it-IT"/>
           </a:p>
@@ -459,7 +459,7 @@
           <a:p>
             <a:fld id="{D8B7E551-822F-4896-9EDE-9E8F0CB865CE}" type="datetimeFigureOut">
               <a:rPr lang="it-IT" smtClean="0"/>
-              <a:t>03/12/2022</a:t>
+              <a:t>05/12/2022</a:t>
             </a:fld>
             <a:endParaRPr lang="it-IT"/>
           </a:p>
@@ -667,7 +667,7 @@
           <a:p>
             <a:fld id="{D8B7E551-822F-4896-9EDE-9E8F0CB865CE}" type="datetimeFigureOut">
               <a:rPr lang="it-IT" smtClean="0"/>
-              <a:t>03/12/2022</a:t>
+              <a:t>05/12/2022</a:t>
             </a:fld>
             <a:endParaRPr lang="it-IT"/>
           </a:p>
@@ -865,7 +865,7 @@
           <a:p>
             <a:fld id="{D8B7E551-822F-4896-9EDE-9E8F0CB865CE}" type="datetimeFigureOut">
               <a:rPr lang="it-IT" smtClean="0"/>
-              <a:t>03/12/2022</a:t>
+              <a:t>05/12/2022</a:t>
             </a:fld>
             <a:endParaRPr lang="it-IT"/>
           </a:p>
@@ -1140,7 +1140,7 @@
           <a:p>
             <a:fld id="{D8B7E551-822F-4896-9EDE-9E8F0CB865CE}" type="datetimeFigureOut">
               <a:rPr lang="it-IT" smtClean="0"/>
-              <a:t>03/12/2022</a:t>
+              <a:t>05/12/2022</a:t>
             </a:fld>
             <a:endParaRPr lang="it-IT"/>
           </a:p>
@@ -1405,7 +1405,7 @@
           <a:p>
             <a:fld id="{D8B7E551-822F-4896-9EDE-9E8F0CB865CE}" type="datetimeFigureOut">
               <a:rPr lang="it-IT" smtClean="0"/>
-              <a:t>03/12/2022</a:t>
+              <a:t>05/12/2022</a:t>
             </a:fld>
             <a:endParaRPr lang="it-IT"/>
           </a:p>
@@ -1817,7 +1817,7 @@
           <a:p>
             <a:fld id="{D8B7E551-822F-4896-9EDE-9E8F0CB865CE}" type="datetimeFigureOut">
               <a:rPr lang="it-IT" smtClean="0"/>
-              <a:t>03/12/2022</a:t>
+              <a:t>05/12/2022</a:t>
             </a:fld>
             <a:endParaRPr lang="it-IT"/>
           </a:p>
@@ -1958,7 +1958,7 @@
           <a:p>
             <a:fld id="{D8B7E551-822F-4896-9EDE-9E8F0CB865CE}" type="datetimeFigureOut">
               <a:rPr lang="it-IT" smtClean="0"/>
-              <a:t>03/12/2022</a:t>
+              <a:t>05/12/2022</a:t>
             </a:fld>
             <a:endParaRPr lang="it-IT"/>
           </a:p>
@@ -2071,7 +2071,7 @@
           <a:p>
             <a:fld id="{D8B7E551-822F-4896-9EDE-9E8F0CB865CE}" type="datetimeFigureOut">
               <a:rPr lang="it-IT" smtClean="0"/>
-              <a:t>03/12/2022</a:t>
+              <a:t>05/12/2022</a:t>
             </a:fld>
             <a:endParaRPr lang="it-IT"/>
           </a:p>
@@ -2382,7 +2382,7 @@
           <a:p>
             <a:fld id="{D8B7E551-822F-4896-9EDE-9E8F0CB865CE}" type="datetimeFigureOut">
               <a:rPr lang="it-IT" smtClean="0"/>
-              <a:t>03/12/2022</a:t>
+              <a:t>05/12/2022</a:t>
             </a:fld>
             <a:endParaRPr lang="it-IT"/>
           </a:p>
@@ -2670,7 +2670,7 @@
           <a:p>
             <a:fld id="{D8B7E551-822F-4896-9EDE-9E8F0CB865CE}" type="datetimeFigureOut">
               <a:rPr lang="it-IT" smtClean="0"/>
-              <a:t>03/12/2022</a:t>
+              <a:t>05/12/2022</a:t>
             </a:fld>
             <a:endParaRPr lang="it-IT"/>
           </a:p>
@@ -2911,7 +2911,7 @@
           <a:p>
             <a:fld id="{D8B7E551-822F-4896-9EDE-9E8F0CB865CE}" type="datetimeFigureOut">
               <a:rPr lang="it-IT" smtClean="0"/>
-              <a:t>03/12/2022</a:t>
+              <a:t>05/12/2022</a:t>
             </a:fld>
             <a:endParaRPr lang="it-IT"/>
           </a:p>
@@ -3499,13 +3499,13 @@
     <a:masterClrMapping/>
   </p:clrMapOvr>
   <mc:AlternateContent xmlns:mc="http://schemas.openxmlformats.org/markup-compatibility/2006">
-    <mc:Choice xmlns:p14="http://schemas.microsoft.com/office/powerpoint/2010/main" Requires="p14">
-      <p:transition spd="med" p14:dur="700">
-        <p:fade/>
+    <mc:Choice xmlns:p159="http://schemas.microsoft.com/office/powerpoint/2015/09/main" Requires="p159">
+      <p:transition xmlns:p14="http://schemas.microsoft.com/office/powerpoint/2010/main" spd="slow" p14:dur="2000">
+        <p159:morph option="byObject"/>
       </p:transition>
     </mc:Choice>
     <mc:Fallback>
-      <p:transition spd="med">
+      <p:transition spd="slow">
         <p:fade/>
       </p:transition>
     </mc:Fallback>
@@ -3532,6 +3532,52 @@
       </p:grpSpPr>
       <p:sp>
         <p:nvSpPr>
+          <p:cNvPr id="5" name="Rettangolo con angoli arrotondati 4">
+            <a:extLst>
+              <a:ext uri="{FF2B5EF4-FFF2-40B4-BE49-F238E27FC236}">
+                <a16:creationId xmlns:a16="http://schemas.microsoft.com/office/drawing/2014/main" id="{A02DCCDE-145F-004A-6264-07C3B4D5A51A}"/>
+              </a:ext>
+            </a:extLst>
+          </p:cNvPr>
+          <p:cNvSpPr/>
+          <p:nvPr/>
+        </p:nvSpPr>
+        <p:spPr>
+          <a:xfrm>
+            <a:off x="1381897" y="521279"/>
+            <a:ext cx="9428206" cy="1013254"/>
+          </a:xfrm>
+          <a:prstGeom prst="roundRect">
+            <a:avLst/>
+          </a:prstGeom>
+        </p:spPr>
+        <p:style>
+          <a:lnRef idx="2">
+            <a:schemeClr val="dk1">
+              <a:shade val="50000"/>
+            </a:schemeClr>
+          </a:lnRef>
+          <a:fillRef idx="1">
+            <a:schemeClr val="dk1"/>
+          </a:fillRef>
+          <a:effectRef idx="0">
+            <a:schemeClr val="dk1"/>
+          </a:effectRef>
+          <a:fontRef idx="minor">
+            <a:schemeClr val="lt1"/>
+          </a:fontRef>
+        </p:style>
+        <p:txBody>
+          <a:bodyPr rtlCol="0" anchor="ctr"/>
+          <a:lstStyle/>
+          <a:p>
+            <a:pPr algn="ctr"/>
+            <a:endParaRPr lang="it-IT"/>
+          </a:p>
+        </p:txBody>
+      </p:sp>
+      <p:sp>
+        <p:nvSpPr>
           <p:cNvPr id="2" name="Titolo 1">
             <a:extLst>
               <a:ext uri="{FF2B5EF4-FFF2-40B4-BE49-F238E27FC236}">
@@ -3556,29 +3602,44 @@
             <a:pPr algn="ctr"/>
             <a:r>
               <a:rPr lang="en-US" sz="4800" dirty="0" err="1">
+                <a:solidFill>
+                  <a:schemeClr val="bg1"/>
+                </a:solidFill>
                 <a:latin typeface="Print Clearly" panose="02000000000000000000" pitchFamily="50" charset="0"/>
               </a:rPr>
               <a:t>Comandi</a:t>
             </a:r>
             <a:r>
               <a:rPr lang="en-US" sz="4800" dirty="0">
+                <a:solidFill>
+                  <a:schemeClr val="bg1"/>
+                </a:solidFill>
                 <a:latin typeface="Print Clearly" panose="02000000000000000000" pitchFamily="50" charset="0"/>
               </a:rPr>
               <a:t> </a:t>
             </a:r>
             <a:r>
               <a:rPr lang="en-US" sz="4800" dirty="0" err="1">
+                <a:solidFill>
+                  <a:schemeClr val="bg1"/>
+                </a:solidFill>
                 <a:latin typeface="Print Clearly" panose="02000000000000000000" pitchFamily="50" charset="0"/>
               </a:rPr>
               <a:t>terminale</a:t>
             </a:r>
             <a:r>
               <a:rPr lang="en-US" sz="4800" dirty="0">
+                <a:solidFill>
+                  <a:schemeClr val="bg1"/>
+                </a:solidFill>
                 <a:latin typeface="Print Clearly" panose="02000000000000000000" pitchFamily="50" charset="0"/>
               </a:rPr>
               <a:t> base</a:t>
             </a:r>
             <a:endParaRPr lang="it-IT" sz="4800" dirty="0">
+              <a:solidFill>
+                <a:schemeClr val="bg1"/>
+              </a:solidFill>
               <a:latin typeface="Print Clearly" panose="02000000000000000000" pitchFamily="50" charset="0"/>
             </a:endParaRPr>
           </a:p>
@@ -3615,7 +3676,6 @@
             <a:r>
               <a:rPr lang="it-IT" sz="1800" i="1" dirty="0" err="1">
                 <a:effectLst/>
-                <a:latin typeface="+mj-lt"/>
                 <a:ea typeface="Calibri" panose="020F0502020204030204" pitchFamily="34" charset="0"/>
                 <a:cs typeface="Times New Roman" panose="02020603050405020304" pitchFamily="18" charset="0"/>
               </a:rPr>
@@ -3624,7 +3684,6 @@
             <a:r>
               <a:rPr lang="it-IT" sz="1800" dirty="0">
                 <a:effectLst/>
-                <a:latin typeface="+mj-lt"/>
                 <a:ea typeface="Calibri" panose="020F0502020204030204" pitchFamily="34" charset="0"/>
                 <a:cs typeface="Times New Roman" panose="02020603050405020304" pitchFamily="18" charset="0"/>
               </a:rPr>
@@ -3640,7 +3699,6 @@
             <a:r>
               <a:rPr lang="it-IT" sz="1800" i="1" dirty="0" err="1">
                 <a:effectLst/>
-                <a:latin typeface="+mj-lt"/>
                 <a:ea typeface="Calibri" panose="020F0502020204030204" pitchFamily="34" charset="0"/>
                 <a:cs typeface="Times New Roman" panose="02020603050405020304" pitchFamily="18" charset="0"/>
               </a:rPr>
@@ -3649,7 +3707,6 @@
             <a:r>
               <a:rPr lang="it-IT" sz="1800" dirty="0">
                 <a:effectLst/>
-                <a:latin typeface="+mj-lt"/>
                 <a:ea typeface="Calibri" panose="020F0502020204030204" pitchFamily="34" charset="0"/>
                 <a:cs typeface="Times New Roman" panose="02020603050405020304" pitchFamily="18" charset="0"/>
               </a:rPr>
@@ -3665,7 +3722,6 @@
             <a:r>
               <a:rPr lang="it-IT" sz="1800" i="1" dirty="0">
                 <a:effectLst/>
-                <a:latin typeface="+mj-lt"/>
                 <a:ea typeface="Calibri" panose="020F0502020204030204" pitchFamily="34" charset="0"/>
                 <a:cs typeface="Times New Roman" panose="02020603050405020304" pitchFamily="18" charset="0"/>
               </a:rPr>
@@ -3674,7 +3730,6 @@
             <a:r>
               <a:rPr lang="it-IT" sz="1800" dirty="0">
                 <a:effectLst/>
-                <a:latin typeface="+mj-lt"/>
                 <a:ea typeface="Calibri" panose="020F0502020204030204" pitchFamily="34" charset="0"/>
                 <a:cs typeface="Times New Roman" panose="02020603050405020304" pitchFamily="18" charset="0"/>
               </a:rPr>
@@ -3690,7 +3745,6 @@
             <a:r>
               <a:rPr lang="it-IT" sz="1800" i="1" dirty="0" err="1">
                 <a:effectLst/>
-                <a:latin typeface="+mj-lt"/>
                 <a:ea typeface="Calibri" panose="020F0502020204030204" pitchFamily="34" charset="0"/>
                 <a:cs typeface="Times New Roman" panose="02020603050405020304" pitchFamily="18" charset="0"/>
               </a:rPr>
@@ -3699,7 +3753,6 @@
             <a:r>
               <a:rPr lang="it-IT" sz="1800" i="1" dirty="0">
                 <a:effectLst/>
-                <a:latin typeface="+mj-lt"/>
                 <a:ea typeface="Calibri" panose="020F0502020204030204" pitchFamily="34" charset="0"/>
                 <a:cs typeface="Times New Roman" panose="02020603050405020304" pitchFamily="18" charset="0"/>
               </a:rPr>
@@ -3708,7 +3761,6 @@
             <a:r>
               <a:rPr lang="it-IT" sz="1800" i="1" dirty="0" err="1">
                 <a:effectLst/>
-                <a:latin typeface="+mj-lt"/>
                 <a:ea typeface="Calibri" panose="020F0502020204030204" pitchFamily="34" charset="0"/>
                 <a:cs typeface="Times New Roman" panose="02020603050405020304" pitchFamily="18" charset="0"/>
               </a:rPr>
@@ -3717,7 +3769,6 @@
             <a:r>
               <a:rPr lang="it-IT" sz="1800" i="1" dirty="0">
                 <a:effectLst/>
-                <a:latin typeface="+mj-lt"/>
                 <a:ea typeface="Calibri" panose="020F0502020204030204" pitchFamily="34" charset="0"/>
                 <a:cs typeface="Times New Roman" panose="02020603050405020304" pitchFamily="18" charset="0"/>
               </a:rPr>
@@ -3726,7 +3777,6 @@
             <a:r>
               <a:rPr lang="it-IT" sz="1800" dirty="0">
                 <a:effectLst/>
-                <a:latin typeface="+mj-lt"/>
                 <a:ea typeface="Calibri" panose="020F0502020204030204" pitchFamily="34" charset="0"/>
                 <a:cs typeface="Times New Roman" panose="02020603050405020304" pitchFamily="18" charset="0"/>
               </a:rPr>
@@ -3742,7 +3792,6 @@
             <a:r>
               <a:rPr lang="it-IT" sz="1800" i="1" dirty="0" err="1">
                 <a:effectLst/>
-                <a:latin typeface="+mj-lt"/>
                 <a:ea typeface="Calibri" panose="020F0502020204030204" pitchFamily="34" charset="0"/>
                 <a:cs typeface="Times New Roman" panose="02020603050405020304" pitchFamily="18" charset="0"/>
               </a:rPr>
@@ -3751,7 +3800,6 @@
             <a:r>
               <a:rPr lang="it-IT" sz="1800" i="1" dirty="0">
                 <a:effectLst/>
-                <a:latin typeface="+mj-lt"/>
                 <a:ea typeface="Calibri" panose="020F0502020204030204" pitchFamily="34" charset="0"/>
                 <a:cs typeface="Times New Roman" panose="02020603050405020304" pitchFamily="18" charset="0"/>
               </a:rPr>
@@ -3759,7 +3807,6 @@
             </a:r>
             <a:r>
               <a:rPr lang="it-IT" sz="1800" i="1" dirty="0">
-                <a:latin typeface="+mj-lt"/>
                 <a:ea typeface="Calibri" panose="020F0502020204030204" pitchFamily="34" charset="0"/>
                 <a:cs typeface="Times New Roman" panose="02020603050405020304" pitchFamily="18" charset="0"/>
               </a:rPr>
@@ -3768,7 +3815,6 @@
             <a:r>
               <a:rPr lang="it-IT" sz="1800" i="1" dirty="0" err="1">
                 <a:effectLst/>
-                <a:latin typeface="+mj-lt"/>
                 <a:ea typeface="Calibri" panose="020F0502020204030204" pitchFamily="34" charset="0"/>
                 <a:cs typeface="Times New Roman" panose="02020603050405020304" pitchFamily="18" charset="0"/>
               </a:rPr>
@@ -3777,7 +3823,6 @@
             <a:r>
               <a:rPr lang="it-IT" sz="1800" i="1" dirty="0">
                 <a:effectLst/>
-                <a:latin typeface="+mj-lt"/>
                 <a:ea typeface="Calibri" panose="020F0502020204030204" pitchFamily="34" charset="0"/>
                 <a:cs typeface="Times New Roman" panose="02020603050405020304" pitchFamily="18" charset="0"/>
               </a:rPr>
@@ -3786,7 +3831,6 @@
             <a:r>
               <a:rPr lang="it-IT" sz="1800" dirty="0">
                 <a:effectLst/>
-                <a:latin typeface="+mj-lt"/>
                 <a:ea typeface="Calibri" panose="020F0502020204030204" pitchFamily="34" charset="0"/>
                 <a:cs typeface="Times New Roman" panose="02020603050405020304" pitchFamily="18" charset="0"/>
               </a:rPr>
@@ -3801,7 +3845,6 @@
             </a:pPr>
             <a:r>
               <a:rPr lang="it-IT" sz="1800" i="1" dirty="0" err="1">
-                <a:latin typeface="+mj-lt"/>
                 <a:ea typeface="Calibri" panose="020F0502020204030204" pitchFamily="34" charset="0"/>
                 <a:cs typeface="Times New Roman" panose="02020603050405020304" pitchFamily="18" charset="0"/>
               </a:rPr>
@@ -3810,7 +3853,6 @@
             <a:r>
               <a:rPr lang="it-IT" sz="1800" i="1" dirty="0" err="1">
                 <a:effectLst/>
-                <a:latin typeface="+mj-lt"/>
                 <a:ea typeface="Calibri" panose="020F0502020204030204" pitchFamily="34" charset="0"/>
                 <a:cs typeface="Times New Roman" panose="02020603050405020304" pitchFamily="18" charset="0"/>
               </a:rPr>
@@ -3818,7 +3860,6 @@
             </a:r>
             <a:r>
               <a:rPr lang="it-IT" sz="1800" i="1" dirty="0">
-                <a:latin typeface="+mj-lt"/>
                 <a:ea typeface="Calibri" panose="020F0502020204030204" pitchFamily="34" charset="0"/>
                 <a:cs typeface="Times New Roman" panose="02020603050405020304" pitchFamily="18" charset="0"/>
               </a:rPr>
@@ -3826,7 +3867,6 @@
             </a:r>
             <a:r>
               <a:rPr lang="it-IT" sz="1800" i="1" dirty="0" err="1">
-                <a:latin typeface="+mj-lt"/>
                 <a:ea typeface="Calibri" panose="020F0502020204030204" pitchFamily="34" charset="0"/>
                 <a:cs typeface="Times New Roman" panose="02020603050405020304" pitchFamily="18" charset="0"/>
               </a:rPr>
@@ -3834,7 +3874,6 @@
             </a:r>
             <a:r>
               <a:rPr lang="it-IT" sz="1800" i="1" dirty="0">
-                <a:latin typeface="+mj-lt"/>
                 <a:ea typeface="Calibri" panose="020F0502020204030204" pitchFamily="34" charset="0"/>
                 <a:cs typeface="Times New Roman" panose="02020603050405020304" pitchFamily="18" charset="0"/>
               </a:rPr>
@@ -3843,7 +3882,6 @@
             <a:r>
               <a:rPr lang="it-IT" sz="1800" i="1" dirty="0" err="1">
                 <a:effectLst/>
-                <a:latin typeface="+mj-lt"/>
                 <a:ea typeface="Calibri" panose="020F0502020204030204" pitchFamily="34" charset="0"/>
                 <a:cs typeface="Times New Roman" panose="02020603050405020304" pitchFamily="18" charset="0"/>
               </a:rPr>
@@ -3852,7 +3890,6 @@
             <a:r>
               <a:rPr lang="it-IT" sz="1800" i="1" dirty="0">
                 <a:effectLst/>
-                <a:latin typeface="+mj-lt"/>
                 <a:ea typeface="Calibri" panose="020F0502020204030204" pitchFamily="34" charset="0"/>
                 <a:cs typeface="Times New Roman" panose="02020603050405020304" pitchFamily="18" charset="0"/>
               </a:rPr>
@@ -3861,7 +3898,6 @@
             <a:r>
               <a:rPr lang="it-IT" sz="1800" dirty="0">
                 <a:effectLst/>
-                <a:latin typeface="+mj-lt"/>
                 <a:ea typeface="Calibri" panose="020F0502020204030204" pitchFamily="34" charset="0"/>
                 <a:cs typeface="Times New Roman" panose="02020603050405020304" pitchFamily="18" charset="0"/>
               </a:rPr>
@@ -3876,7 +3912,6 @@
             </a:pPr>
             <a:r>
               <a:rPr lang="it-IT" sz="1800" i="1" dirty="0">
-                <a:latin typeface="+mj-lt"/>
                 <a:ea typeface="Calibri" panose="020F0502020204030204" pitchFamily="34" charset="0"/>
                 <a:cs typeface="Times New Roman" panose="02020603050405020304" pitchFamily="18" charset="0"/>
               </a:rPr>
@@ -3884,7 +3919,6 @@
             </a:r>
             <a:r>
               <a:rPr lang="it-IT" sz="1800" i="1" dirty="0" err="1">
-                <a:latin typeface="+mj-lt"/>
                 <a:ea typeface="Calibri" panose="020F0502020204030204" pitchFamily="34" charset="0"/>
                 <a:cs typeface="Times New Roman" panose="02020603050405020304" pitchFamily="18" charset="0"/>
               </a:rPr>
@@ -3892,7 +3926,6 @@
             </a:r>
             <a:r>
               <a:rPr lang="it-IT" sz="1800" i="1" dirty="0">
-                <a:latin typeface="+mj-lt"/>
                 <a:ea typeface="Calibri" panose="020F0502020204030204" pitchFamily="34" charset="0"/>
                 <a:cs typeface="Times New Roman" panose="02020603050405020304" pitchFamily="18" charset="0"/>
               </a:rPr>
@@ -3900,7 +3933,6 @@
             </a:r>
             <a:r>
               <a:rPr lang="it-IT" sz="1800" dirty="0">
-                <a:latin typeface="+mj-lt"/>
                 <a:ea typeface="Calibri" panose="020F0502020204030204" pitchFamily="34" charset="0"/>
                 <a:cs typeface="Times New Roman" panose="02020603050405020304" pitchFamily="18" charset="0"/>
               </a:rPr>
@@ -3908,7 +3940,6 @@
             </a:r>
             <a:endParaRPr lang="it-IT" sz="1800" dirty="0">
               <a:effectLst/>
-              <a:latin typeface="+mj-lt"/>
               <a:ea typeface="Calibri" panose="020F0502020204030204" pitchFamily="34" charset="0"/>
               <a:cs typeface="Times New Roman" panose="02020603050405020304" pitchFamily="18" charset="0"/>
             </a:endParaRPr>
@@ -3921,7 +3952,6 @@
             </a:pPr>
             <a:r>
               <a:rPr lang="it-IT" sz="1800" i="1" dirty="0" err="1">
-                <a:latin typeface="+mj-lt"/>
                 <a:ea typeface="Calibri" panose="020F0502020204030204" pitchFamily="34" charset="0"/>
                 <a:cs typeface="Times New Roman" panose="02020603050405020304" pitchFamily="18" charset="0"/>
               </a:rPr>
@@ -3929,7 +3959,6 @@
             </a:r>
             <a:r>
               <a:rPr lang="it-IT" sz="1800" dirty="0">
-                <a:latin typeface="+mj-lt"/>
                 <a:ea typeface="Calibri" panose="020F0502020204030204" pitchFamily="34" charset="0"/>
                 <a:cs typeface="Times New Roman" panose="02020603050405020304" pitchFamily="18" charset="0"/>
               </a:rPr>
@@ -3944,7 +3973,6 @@
             </a:pPr>
             <a:r>
               <a:rPr lang="it-IT" sz="1800" i="1" dirty="0">
-                <a:latin typeface="+mj-lt"/>
                 <a:ea typeface="Calibri" panose="020F0502020204030204" pitchFamily="34" charset="0"/>
                 <a:cs typeface="Times New Roman" panose="02020603050405020304" pitchFamily="18" charset="0"/>
               </a:rPr>
@@ -3952,7 +3980,6 @@
             </a:r>
             <a:r>
               <a:rPr lang="it-IT" sz="1800" dirty="0">
-                <a:latin typeface="+mj-lt"/>
                 <a:ea typeface="Calibri" panose="020F0502020204030204" pitchFamily="34" charset="0"/>
                 <a:cs typeface="Times New Roman" panose="02020603050405020304" pitchFamily="18" charset="0"/>
               </a:rPr>
@@ -3968,7 +3995,6 @@
             <a:r>
               <a:rPr lang="it-IT" sz="1800" i="1" dirty="0" err="1">
                 <a:effectLst/>
-                <a:latin typeface="+mj-lt"/>
                 <a:ea typeface="Calibri" panose="020F0502020204030204" pitchFamily="34" charset="0"/>
                 <a:cs typeface="Times New Roman" panose="02020603050405020304" pitchFamily="18" charset="0"/>
               </a:rPr>
@@ -3977,27 +4003,11 @@
             <a:r>
               <a:rPr lang="it-IT" sz="1800" dirty="0">
                 <a:effectLst/>
-                <a:latin typeface="+mj-lt"/>
-                <a:ea typeface="Calibri" panose="020F0502020204030204" pitchFamily="34" charset="0"/>
-                <a:cs typeface="Times New Roman" panose="02020603050405020304" pitchFamily="18" charset="0"/>
-              </a:rPr>
-              <a:t> </a:t>
-            </a:r>
-            <a:r>
-              <a:rPr lang="it-IT" sz="1800">
-                <a:effectLst/>
-                <a:latin typeface="+mj-lt"/>
-                <a:ea typeface="Calibri" panose="020F0502020204030204" pitchFamily="34" charset="0"/>
-                <a:cs typeface="Times New Roman" panose="02020603050405020304" pitchFamily="18" charset="0"/>
-              </a:rPr>
-              <a:t>-&gt; ?</a:t>
-            </a:r>
-            <a:endParaRPr lang="it-IT" sz="1800" dirty="0">
-              <a:effectLst/>
-              <a:latin typeface="+mj-lt"/>
-              <a:ea typeface="Calibri" panose="020F0502020204030204" pitchFamily="34" charset="0"/>
-              <a:cs typeface="Times New Roman" panose="02020603050405020304" pitchFamily="18" charset="0"/>
-            </a:endParaRPr>
+                <a:ea typeface="Calibri" panose="020F0502020204030204" pitchFamily="34" charset="0"/>
+                <a:cs typeface="Times New Roman" panose="02020603050405020304" pitchFamily="18" charset="0"/>
+              </a:rPr>
+              <a:t> -&gt; ?</a:t>
+            </a:r>
           </a:p>
         </p:txBody>
       </p:sp>
@@ -4047,13 +4057,13 @@
   <p:clrMapOvr>
     <a:masterClrMapping/>
   </p:clrMapOvr>
-  <mc:AlternateContent xmlns:mc="http://schemas.openxmlformats.org/markup-compatibility/2006">
-    <mc:Choice xmlns:p14="http://schemas.microsoft.com/office/powerpoint/2010/main" Requires="p14">
+  <mc:AlternateContent xmlns:mc="http://schemas.openxmlformats.org/markup-compatibility/2006" xmlns:p14="http://schemas.microsoft.com/office/powerpoint/2010/main">
+    <mc:Choice Requires="p14">
       <p:transition spd="med" p14:dur="700">
         <p:fade/>
       </p:transition>
     </mc:Choice>
-    <mc:Fallback>
+    <mc:Fallback xmlns="">
       <p:transition spd="med">
         <p:fade/>
       </p:transition>
@@ -4081,6 +4091,52 @@
       </p:grpSpPr>
       <p:sp>
         <p:nvSpPr>
+          <p:cNvPr id="5" name="Rettangolo con angoli arrotondati 4">
+            <a:extLst>
+              <a:ext uri="{FF2B5EF4-FFF2-40B4-BE49-F238E27FC236}">
+                <a16:creationId xmlns:a16="http://schemas.microsoft.com/office/drawing/2014/main" id="{19569913-B99F-68A3-3615-41C2F7E87E4A}"/>
+              </a:ext>
+            </a:extLst>
+          </p:cNvPr>
+          <p:cNvSpPr/>
+          <p:nvPr/>
+        </p:nvSpPr>
+        <p:spPr>
+          <a:xfrm>
+            <a:off x="1381897" y="521279"/>
+            <a:ext cx="9428206" cy="1013254"/>
+          </a:xfrm>
+          <a:prstGeom prst="roundRect">
+            <a:avLst/>
+          </a:prstGeom>
+        </p:spPr>
+        <p:style>
+          <a:lnRef idx="2">
+            <a:schemeClr val="dk1">
+              <a:shade val="50000"/>
+            </a:schemeClr>
+          </a:lnRef>
+          <a:fillRef idx="1">
+            <a:schemeClr val="dk1"/>
+          </a:fillRef>
+          <a:effectRef idx="0">
+            <a:schemeClr val="dk1"/>
+          </a:effectRef>
+          <a:fontRef idx="minor">
+            <a:schemeClr val="lt1"/>
+          </a:fontRef>
+        </p:style>
+        <p:txBody>
+          <a:bodyPr rtlCol="0" anchor="ctr"/>
+          <a:lstStyle/>
+          <a:p>
+            <a:pPr algn="ctr"/>
+            <a:endParaRPr lang="it-IT"/>
+          </a:p>
+        </p:txBody>
+      </p:sp>
+      <p:sp>
+        <p:nvSpPr>
           <p:cNvPr id="2" name="Titolo 1">
             <a:extLst>
               <a:ext uri="{FF2B5EF4-FFF2-40B4-BE49-F238E27FC236}">
@@ -4105,29 +4161,44 @@
             <a:pPr algn="ctr"/>
             <a:r>
               <a:rPr lang="en-US" sz="4800" dirty="0" err="1">
+                <a:solidFill>
+                  <a:schemeClr val="bg1"/>
+                </a:solidFill>
                 <a:latin typeface="Print Clearly" panose="02000000000000000000" pitchFamily="50" charset="0"/>
               </a:rPr>
               <a:t>Comandi</a:t>
             </a:r>
             <a:r>
               <a:rPr lang="en-US" sz="4800" dirty="0">
+                <a:solidFill>
+                  <a:schemeClr val="bg1"/>
+                </a:solidFill>
                 <a:latin typeface="Print Clearly" panose="02000000000000000000" pitchFamily="50" charset="0"/>
               </a:rPr>
               <a:t> </a:t>
             </a:r>
             <a:r>
               <a:rPr lang="en-US" sz="4800" dirty="0" err="1">
+                <a:solidFill>
+                  <a:schemeClr val="bg1"/>
+                </a:solidFill>
                 <a:latin typeface="Print Clearly" panose="02000000000000000000" pitchFamily="50" charset="0"/>
               </a:rPr>
               <a:t>terminale</a:t>
             </a:r>
             <a:r>
               <a:rPr lang="en-US" sz="4800" dirty="0">
+                <a:solidFill>
+                  <a:schemeClr val="bg1"/>
+                </a:solidFill>
                 <a:latin typeface="Print Clearly" panose="02000000000000000000" pitchFamily="50" charset="0"/>
               </a:rPr>
               <a:t> base</a:t>
             </a:r>
             <a:endParaRPr lang="it-IT" sz="4800" dirty="0">
+              <a:solidFill>
+                <a:schemeClr val="bg1"/>
+              </a:solidFill>
               <a:latin typeface="Print Clearly" panose="02000000000000000000" pitchFamily="50" charset="0"/>
             </a:endParaRPr>
           </a:p>
@@ -4164,7 +4235,6 @@
             <a:r>
               <a:rPr lang="it-IT" sz="1800" i="1" dirty="0" err="1">
                 <a:effectLst/>
-                <a:latin typeface="+mj-lt"/>
                 <a:ea typeface="Calibri" panose="020F0502020204030204" pitchFamily="34" charset="0"/>
                 <a:cs typeface="Times New Roman" panose="02020603050405020304" pitchFamily="18" charset="0"/>
               </a:rPr>
@@ -4173,7 +4243,6 @@
             <a:r>
               <a:rPr lang="it-IT" sz="1800" dirty="0">
                 <a:effectLst/>
-                <a:latin typeface="+mj-lt"/>
                 <a:ea typeface="Calibri" panose="020F0502020204030204" pitchFamily="34" charset="0"/>
                 <a:cs typeface="Times New Roman" panose="02020603050405020304" pitchFamily="18" charset="0"/>
               </a:rPr>
@@ -4189,7 +4258,6 @@
             <a:r>
               <a:rPr lang="it-IT" sz="1800" i="1" dirty="0" err="1">
                 <a:effectLst/>
-                <a:latin typeface="+mj-lt"/>
                 <a:ea typeface="Calibri" panose="020F0502020204030204" pitchFamily="34" charset="0"/>
                 <a:cs typeface="Times New Roman" panose="02020603050405020304" pitchFamily="18" charset="0"/>
               </a:rPr>
@@ -4198,7 +4266,6 @@
             <a:r>
               <a:rPr lang="it-IT" sz="1800" dirty="0">
                 <a:effectLst/>
-                <a:latin typeface="+mj-lt"/>
                 <a:ea typeface="Calibri" panose="020F0502020204030204" pitchFamily="34" charset="0"/>
                 <a:cs typeface="Times New Roman" panose="02020603050405020304" pitchFamily="18" charset="0"/>
               </a:rPr>
@@ -4214,7 +4281,6 @@
             <a:r>
               <a:rPr lang="it-IT" sz="1800" i="1" dirty="0">
                 <a:effectLst/>
-                <a:latin typeface="+mj-lt"/>
                 <a:ea typeface="Calibri" panose="020F0502020204030204" pitchFamily="34" charset="0"/>
                 <a:cs typeface="Times New Roman" panose="02020603050405020304" pitchFamily="18" charset="0"/>
               </a:rPr>
@@ -4223,7 +4289,6 @@
             <a:r>
               <a:rPr lang="it-IT" sz="1800" dirty="0">
                 <a:effectLst/>
-                <a:latin typeface="+mj-lt"/>
                 <a:ea typeface="Calibri" panose="020F0502020204030204" pitchFamily="34" charset="0"/>
                 <a:cs typeface="Times New Roman" panose="02020603050405020304" pitchFamily="18" charset="0"/>
               </a:rPr>
@@ -4232,7 +4297,6 @@
             <a:r>
               <a:rPr lang="it-IT" sz="1800" dirty="0" err="1">
                 <a:effectLst/>
-                <a:latin typeface="+mj-lt"/>
                 <a:ea typeface="Calibri" panose="020F0502020204030204" pitchFamily="34" charset="0"/>
                 <a:cs typeface="Times New Roman" panose="02020603050405020304" pitchFamily="18" charset="0"/>
               </a:rPr>
@@ -4241,7 +4305,6 @@
             <a:r>
               <a:rPr lang="it-IT" sz="1800" dirty="0">
                 <a:effectLst/>
-                <a:latin typeface="+mj-lt"/>
                 <a:ea typeface="Calibri" panose="020F0502020204030204" pitchFamily="34" charset="0"/>
                 <a:cs typeface="Times New Roman" panose="02020603050405020304" pitchFamily="18" charset="0"/>
               </a:rPr>
@@ -4257,7 +4320,6 @@
             <a:r>
               <a:rPr lang="it-IT" sz="1800" i="1" dirty="0" err="1">
                 <a:effectLst/>
-                <a:latin typeface="+mj-lt"/>
                 <a:ea typeface="Calibri" panose="020F0502020204030204" pitchFamily="34" charset="0"/>
                 <a:cs typeface="Times New Roman" panose="02020603050405020304" pitchFamily="18" charset="0"/>
               </a:rPr>
@@ -4266,7 +4328,6 @@
             <a:r>
               <a:rPr lang="it-IT" sz="1800" i="1" dirty="0">
                 <a:effectLst/>
-                <a:latin typeface="+mj-lt"/>
                 <a:ea typeface="Calibri" panose="020F0502020204030204" pitchFamily="34" charset="0"/>
                 <a:cs typeface="Times New Roman" panose="02020603050405020304" pitchFamily="18" charset="0"/>
               </a:rPr>
@@ -4275,7 +4336,6 @@
             <a:r>
               <a:rPr lang="it-IT" sz="1800" i="1" dirty="0" err="1">
                 <a:effectLst/>
-                <a:latin typeface="+mj-lt"/>
                 <a:ea typeface="Calibri" panose="020F0502020204030204" pitchFamily="34" charset="0"/>
                 <a:cs typeface="Times New Roman" panose="02020603050405020304" pitchFamily="18" charset="0"/>
               </a:rPr>
@@ -4284,7 +4344,6 @@
             <a:r>
               <a:rPr lang="it-IT" sz="1800" dirty="0">
                 <a:effectLst/>
-                <a:latin typeface="+mj-lt"/>
                 <a:ea typeface="Calibri" panose="020F0502020204030204" pitchFamily="34" charset="0"/>
                 <a:cs typeface="Times New Roman" panose="02020603050405020304" pitchFamily="18" charset="0"/>
               </a:rPr>
@@ -4300,7 +4359,6 @@
             <a:r>
               <a:rPr lang="it-IT" sz="1800" i="1" dirty="0" err="1">
                 <a:effectLst/>
-                <a:latin typeface="+mj-lt"/>
                 <a:ea typeface="Calibri" panose="020F0502020204030204" pitchFamily="34" charset="0"/>
                 <a:cs typeface="Times New Roman" panose="02020603050405020304" pitchFamily="18" charset="0"/>
               </a:rPr>
@@ -4309,7 +4367,6 @@
             <a:r>
               <a:rPr lang="it-IT" sz="1800" i="1" dirty="0">
                 <a:effectLst/>
-                <a:latin typeface="+mj-lt"/>
                 <a:ea typeface="Calibri" panose="020F0502020204030204" pitchFamily="34" charset="0"/>
                 <a:cs typeface="Times New Roman" panose="02020603050405020304" pitchFamily="18" charset="0"/>
               </a:rPr>
@@ -4318,7 +4375,6 @@
             <a:r>
               <a:rPr lang="it-IT" sz="1800" i="1" dirty="0" err="1">
                 <a:effectLst/>
-                <a:latin typeface="+mj-lt"/>
                 <a:ea typeface="Calibri" panose="020F0502020204030204" pitchFamily="34" charset="0"/>
                 <a:cs typeface="Times New Roman" panose="02020603050405020304" pitchFamily="18" charset="0"/>
               </a:rPr>
@@ -4327,7 +4383,6 @@
             <a:r>
               <a:rPr lang="it-IT" sz="1800" i="1" dirty="0">
                 <a:effectLst/>
-                <a:latin typeface="+mj-lt"/>
                 <a:ea typeface="Calibri" panose="020F0502020204030204" pitchFamily="34" charset="0"/>
                 <a:cs typeface="Times New Roman" panose="02020603050405020304" pitchFamily="18" charset="0"/>
               </a:rPr>
@@ -4336,7 +4391,6 @@
             <a:r>
               <a:rPr lang="it-IT" sz="1800" dirty="0">
                 <a:effectLst/>
-                <a:latin typeface="+mj-lt"/>
                 <a:ea typeface="Calibri" panose="020F0502020204030204" pitchFamily="34" charset="0"/>
                 <a:cs typeface="Times New Roman" panose="02020603050405020304" pitchFamily="18" charset="0"/>
               </a:rPr>
@@ -4351,7 +4405,6 @@
             </a:pPr>
             <a:r>
               <a:rPr lang="it-IT" sz="1800" i="1" dirty="0" err="1">
-                <a:latin typeface="+mj-lt"/>
                 <a:ea typeface="Calibri" panose="020F0502020204030204" pitchFamily="34" charset="0"/>
                 <a:cs typeface="Times New Roman" panose="02020603050405020304" pitchFamily="18" charset="0"/>
               </a:rPr>
@@ -4359,7 +4412,6 @@
             </a:r>
             <a:r>
               <a:rPr lang="it-IT" sz="1800" i="1" dirty="0">
-                <a:latin typeface="+mj-lt"/>
                 <a:ea typeface="Calibri" panose="020F0502020204030204" pitchFamily="34" charset="0"/>
                 <a:cs typeface="Times New Roman" panose="02020603050405020304" pitchFamily="18" charset="0"/>
               </a:rPr>
@@ -4367,7 +4419,6 @@
             </a:r>
             <a:r>
               <a:rPr lang="it-IT" sz="1800" i="1" dirty="0" err="1">
-                <a:latin typeface="+mj-lt"/>
                 <a:ea typeface="Calibri" panose="020F0502020204030204" pitchFamily="34" charset="0"/>
                 <a:cs typeface="Times New Roman" panose="02020603050405020304" pitchFamily="18" charset="0"/>
               </a:rPr>
@@ -4375,7 +4426,6 @@
             </a:r>
             <a:r>
               <a:rPr lang="it-IT" sz="1800" i="1" dirty="0">
-                <a:latin typeface="+mj-lt"/>
                 <a:ea typeface="Calibri" panose="020F0502020204030204" pitchFamily="34" charset="0"/>
                 <a:cs typeface="Times New Roman" panose="02020603050405020304" pitchFamily="18" charset="0"/>
               </a:rPr>
@@ -4383,7 +4433,6 @@
             </a:r>
             <a:r>
               <a:rPr lang="it-IT" sz="1800" i="1" dirty="0" err="1">
-                <a:latin typeface="+mj-lt"/>
                 <a:ea typeface="Calibri" panose="020F0502020204030204" pitchFamily="34" charset="0"/>
                 <a:cs typeface="Times New Roman" panose="02020603050405020304" pitchFamily="18" charset="0"/>
               </a:rPr>
@@ -4391,7 +4440,6 @@
             </a:r>
             <a:r>
               <a:rPr lang="it-IT" sz="1800" i="1" dirty="0">
-                <a:latin typeface="+mj-lt"/>
                 <a:ea typeface="Calibri" panose="020F0502020204030204" pitchFamily="34" charset="0"/>
                 <a:cs typeface="Times New Roman" panose="02020603050405020304" pitchFamily="18" charset="0"/>
               </a:rPr>
@@ -4400,7 +4448,6 @@
             <a:r>
               <a:rPr lang="it-IT" sz="1800" dirty="0">
                 <a:effectLst/>
-                <a:latin typeface="+mj-lt"/>
                 <a:ea typeface="Calibri" panose="020F0502020204030204" pitchFamily="34" charset="0"/>
                 <a:cs typeface="Times New Roman" panose="02020603050405020304" pitchFamily="18" charset="0"/>
               </a:rPr>
@@ -4415,7 +4462,6 @@
             </a:pPr>
             <a:r>
               <a:rPr lang="it-IT" sz="1800" i="1" dirty="0">
-                <a:latin typeface="+mj-lt"/>
                 <a:ea typeface="Calibri" panose="020F0502020204030204" pitchFamily="34" charset="0"/>
                 <a:cs typeface="Times New Roman" panose="02020603050405020304" pitchFamily="18" charset="0"/>
               </a:rPr>
@@ -4423,7 +4469,6 @@
             </a:r>
             <a:r>
               <a:rPr lang="it-IT" sz="1800" i="1" dirty="0" err="1">
-                <a:latin typeface="+mj-lt"/>
                 <a:ea typeface="Calibri" panose="020F0502020204030204" pitchFamily="34" charset="0"/>
                 <a:cs typeface="Times New Roman" panose="02020603050405020304" pitchFamily="18" charset="0"/>
               </a:rPr>
@@ -4431,7 +4476,6 @@
             </a:r>
             <a:r>
               <a:rPr lang="it-IT" sz="1800" i="1" dirty="0">
-                <a:latin typeface="+mj-lt"/>
                 <a:ea typeface="Calibri" panose="020F0502020204030204" pitchFamily="34" charset="0"/>
                 <a:cs typeface="Times New Roman" panose="02020603050405020304" pitchFamily="18" charset="0"/>
               </a:rPr>
@@ -4439,7 +4483,6 @@
             </a:r>
             <a:r>
               <a:rPr lang="it-IT" sz="1800" dirty="0">
-                <a:latin typeface="+mj-lt"/>
                 <a:ea typeface="Calibri" panose="020F0502020204030204" pitchFamily="34" charset="0"/>
                 <a:cs typeface="Times New Roman" panose="02020603050405020304" pitchFamily="18" charset="0"/>
               </a:rPr>
@@ -4447,7 +4490,6 @@
             </a:r>
             <a:endParaRPr lang="it-IT" sz="1800" dirty="0">
               <a:effectLst/>
-              <a:latin typeface="+mj-lt"/>
               <a:ea typeface="Calibri" panose="020F0502020204030204" pitchFamily="34" charset="0"/>
               <a:cs typeface="Times New Roman" panose="02020603050405020304" pitchFamily="18" charset="0"/>
             </a:endParaRPr>
@@ -4460,7 +4502,6 @@
             </a:pPr>
             <a:r>
               <a:rPr lang="it-IT" sz="1800" i="1" dirty="0" err="1">
-                <a:latin typeface="+mj-lt"/>
                 <a:ea typeface="Calibri" panose="020F0502020204030204" pitchFamily="34" charset="0"/>
                 <a:cs typeface="Times New Roman" panose="02020603050405020304" pitchFamily="18" charset="0"/>
               </a:rPr>
@@ -4468,7 +4509,6 @@
             </a:r>
             <a:r>
               <a:rPr lang="it-IT" sz="1800" dirty="0">
-                <a:latin typeface="+mj-lt"/>
                 <a:ea typeface="Calibri" panose="020F0502020204030204" pitchFamily="34" charset="0"/>
                 <a:cs typeface="Times New Roman" panose="02020603050405020304" pitchFamily="18" charset="0"/>
               </a:rPr>
@@ -4483,7 +4523,6 @@
             </a:pPr>
             <a:r>
               <a:rPr lang="it-IT" sz="1800" i="1" dirty="0">
-                <a:latin typeface="+mj-lt"/>
                 <a:ea typeface="Calibri" panose="020F0502020204030204" pitchFamily="34" charset="0"/>
                 <a:cs typeface="Times New Roman" panose="02020603050405020304" pitchFamily="18" charset="0"/>
               </a:rPr>
@@ -4491,7 +4530,6 @@
             </a:r>
             <a:r>
               <a:rPr lang="it-IT" sz="1800" dirty="0">
-                <a:latin typeface="+mj-lt"/>
                 <a:ea typeface="Calibri" panose="020F0502020204030204" pitchFamily="34" charset="0"/>
                 <a:cs typeface="Times New Roman" panose="02020603050405020304" pitchFamily="18" charset="0"/>
               </a:rPr>
@@ -4507,7 +4545,6 @@
             <a:r>
               <a:rPr lang="it-IT" sz="1800" i="1" dirty="0" err="1">
                 <a:effectLst/>
-                <a:latin typeface="+mj-lt"/>
                 <a:ea typeface="Calibri" panose="020F0502020204030204" pitchFamily="34" charset="0"/>
                 <a:cs typeface="Times New Roman" panose="02020603050405020304" pitchFamily="18" charset="0"/>
               </a:rPr>
@@ -4516,7 +4553,6 @@
             <a:r>
               <a:rPr lang="it-IT" sz="1800" dirty="0">
                 <a:effectLst/>
-                <a:latin typeface="+mj-lt"/>
                 <a:ea typeface="Calibri" panose="020F0502020204030204" pitchFamily="34" charset="0"/>
                 <a:cs typeface="Times New Roman" panose="02020603050405020304" pitchFamily="18" charset="0"/>
               </a:rPr>
@@ -4571,13 +4607,13 @@
   <p:clrMapOvr>
     <a:masterClrMapping/>
   </p:clrMapOvr>
-  <mc:AlternateContent xmlns:mc="http://schemas.openxmlformats.org/markup-compatibility/2006">
-    <mc:Choice xmlns:p159="http://schemas.microsoft.com/office/powerpoint/2015/09/main" Requires="p159">
+  <mc:AlternateContent xmlns:mc="http://schemas.openxmlformats.org/markup-compatibility/2006" xmlns:p159="http://schemas.microsoft.com/office/powerpoint/2015/09/main">
+    <mc:Choice Requires="p159">
       <p:transition xmlns:p14="http://schemas.microsoft.com/office/powerpoint/2010/main" spd="slow" p14:dur="2000">
         <p159:morph option="byWord"/>
       </p:transition>
     </mc:Choice>
-    <mc:Fallback>
+    <mc:Fallback xmlns="">
       <p:transition spd="slow">
         <p:fade/>
       </p:transition>

</xml_diff>